<commit_message>
Added usage to presentation, added winddir offset to controller config
</commit_message>
<xml_diff>
--- a/Presentation.pptx
+++ b/Presentation.pptx
@@ -14,8 +14,10 @@
     <p:sldId id="260" r:id="rId8"/>
     <p:sldId id="261" r:id="rId9"/>
     <p:sldId id="262" r:id="rId10"/>
-    <p:sldId id="264" r:id="rId11"/>
-    <p:sldId id="265" r:id="rId12"/>
+    <p:sldId id="269" r:id="rId11"/>
+    <p:sldId id="270" r:id="rId12"/>
+    <p:sldId id="264" r:id="rId13"/>
+    <p:sldId id="265" r:id="rId14"/>
   </p:sldIdLst>
   <p:sldSz cx="12192000" cy="6858000"/>
   <p:notesSz cx="6858000" cy="9144000"/>
@@ -114,6 +116,11 @@
       </a:defRPr>
     </a:lvl9pPr>
   </p:defaultTextStyle>
+  <p:extLst>
+    <p:ext uri="{EFAFB233-063F-42B5-8137-9DF3F51BA10A}">
+      <p15:sldGuideLst xmlns:p15="http://schemas.microsoft.com/office/powerpoint/2012/main"/>
+    </p:ext>
+  </p:extLst>
 </p:presentation>
 </file>
 
@@ -3424,6 +3431,1110 @@
       </p:grpSpPr>
       <p:sp>
         <p:nvSpPr>
+          <p:cNvPr id="2" name="Title 1">
+            <a:extLst>
+              <a:ext uri="{FF2B5EF4-FFF2-40B4-BE49-F238E27FC236}">
+                <a16:creationId xmlns:a16="http://schemas.microsoft.com/office/drawing/2014/main" id="{1903578F-60F4-4A7B-9DE7-BAC224182231}"/>
+              </a:ext>
+            </a:extLst>
+          </p:cNvPr>
+          <p:cNvSpPr>
+            <a:spLocks noGrp="1"/>
+          </p:cNvSpPr>
+          <p:nvPr>
+            <p:ph type="title"/>
+          </p:nvPr>
+        </p:nvSpPr>
+        <p:spPr/>
+        <p:txBody>
+          <a:bodyPr/>
+          <a:lstStyle/>
+          <a:p>
+            <a:r>
+              <a:rPr lang="en-US" dirty="0" err="1">
+                <a:latin typeface="Abadi Extra Light" panose="020B0204020104020204" pitchFamily="34" charset="0"/>
+              </a:rPr>
+              <a:t>PgAdmin</a:t>
+            </a:r>
+            <a:endParaRPr lang="en-US" dirty="0">
+              <a:latin typeface="Abadi Extra Light" panose="020B0204020104020204" pitchFamily="34" charset="0"/>
+            </a:endParaRPr>
+          </a:p>
+        </p:txBody>
+      </p:sp>
+      <p:cxnSp>
+        <p:nvCxnSpPr>
+          <p:cNvPr id="15" name="Straight Connector 14">
+            <a:extLst>
+              <a:ext uri="{FF2B5EF4-FFF2-40B4-BE49-F238E27FC236}">
+                <a16:creationId xmlns:a16="http://schemas.microsoft.com/office/drawing/2014/main" id="{17593F09-B2DB-4D0B-B67A-FDBBA69A0934}"/>
+              </a:ext>
+            </a:extLst>
+          </p:cNvPr>
+          <p:cNvCxnSpPr>
+            <a:cxnSpLocks/>
+          </p:cNvCxnSpPr>
+          <p:nvPr/>
+        </p:nvCxnSpPr>
+        <p:spPr>
+          <a:xfrm>
+            <a:off x="761837" y="1396181"/>
+            <a:ext cx="10668327" cy="0"/>
+          </a:xfrm>
+          <a:prstGeom prst="line">
+            <a:avLst/>
+          </a:prstGeom>
+          <a:ln>
+            <a:solidFill>
+              <a:schemeClr val="bg1">
+                <a:lumMod val="85000"/>
+              </a:schemeClr>
+            </a:solidFill>
+          </a:ln>
+        </p:spPr>
+        <p:style>
+          <a:lnRef idx="1">
+            <a:schemeClr val="accent1"/>
+          </a:lnRef>
+          <a:fillRef idx="0">
+            <a:schemeClr val="accent1"/>
+          </a:fillRef>
+          <a:effectRef idx="0">
+            <a:schemeClr val="accent1"/>
+          </a:effectRef>
+          <a:fontRef idx="minor">
+            <a:schemeClr val="tx1"/>
+          </a:fontRef>
+        </p:style>
+      </p:cxnSp>
+      <p:cxnSp>
+        <p:nvCxnSpPr>
+          <p:cNvPr id="10" name="Straight Connector 9">
+            <a:extLst>
+              <a:ext uri="{FF2B5EF4-FFF2-40B4-BE49-F238E27FC236}">
+                <a16:creationId xmlns:a16="http://schemas.microsoft.com/office/drawing/2014/main" id="{8830F824-E101-496B-B421-67A36E4D8518}"/>
+              </a:ext>
+            </a:extLst>
+          </p:cNvPr>
+          <p:cNvCxnSpPr>
+            <a:cxnSpLocks/>
+          </p:cNvCxnSpPr>
+          <p:nvPr/>
+        </p:nvCxnSpPr>
+        <p:spPr>
+          <a:xfrm>
+            <a:off x="3783106" y="1396181"/>
+            <a:ext cx="0" cy="3776454"/>
+          </a:xfrm>
+          <a:prstGeom prst="line">
+            <a:avLst/>
+          </a:prstGeom>
+          <a:ln>
+            <a:solidFill>
+              <a:schemeClr val="bg1">
+                <a:lumMod val="85000"/>
+              </a:schemeClr>
+            </a:solidFill>
+          </a:ln>
+        </p:spPr>
+        <p:style>
+          <a:lnRef idx="1">
+            <a:schemeClr val="accent1"/>
+          </a:lnRef>
+          <a:fillRef idx="0">
+            <a:schemeClr val="accent1"/>
+          </a:fillRef>
+          <a:effectRef idx="0">
+            <a:schemeClr val="accent1"/>
+          </a:effectRef>
+          <a:fontRef idx="minor">
+            <a:schemeClr val="tx1"/>
+          </a:fontRef>
+        </p:style>
+      </p:cxnSp>
+      <p:pic>
+        <p:nvPicPr>
+          <p:cNvPr id="5" name="Picture 4">
+            <a:extLst>
+              <a:ext uri="{FF2B5EF4-FFF2-40B4-BE49-F238E27FC236}">
+                <a16:creationId xmlns:a16="http://schemas.microsoft.com/office/drawing/2014/main" id="{DEC27F1F-4711-4717-9202-C5D4B465F509}"/>
+              </a:ext>
+            </a:extLst>
+          </p:cNvPr>
+          <p:cNvPicPr>
+            <a:picLocks noChangeAspect="1"/>
+          </p:cNvPicPr>
+          <p:nvPr/>
+        </p:nvPicPr>
+        <p:blipFill rotWithShape="1">
+          <a:blip r:embed="rId2"/>
+          <a:srcRect t="227"/>
+          <a:stretch/>
+        </p:blipFill>
+        <p:spPr>
+          <a:xfrm>
+            <a:off x="761835" y="1537859"/>
+            <a:ext cx="2955395" cy="4728465"/>
+          </a:xfrm>
+          <a:prstGeom prst="rect">
+            <a:avLst/>
+          </a:prstGeom>
+        </p:spPr>
+      </p:pic>
+      <p:sp>
+        <p:nvSpPr>
+          <p:cNvPr id="14" name="Content Placeholder 2">
+            <a:extLst>
+              <a:ext uri="{FF2B5EF4-FFF2-40B4-BE49-F238E27FC236}">
+                <a16:creationId xmlns:a16="http://schemas.microsoft.com/office/drawing/2014/main" id="{A10533A2-523F-42F5-A4AF-3DA5416198F6}"/>
+              </a:ext>
+            </a:extLst>
+          </p:cNvPr>
+          <p:cNvSpPr txBox="1">
+            <a:spLocks/>
+          </p:cNvSpPr>
+          <p:nvPr/>
+        </p:nvSpPr>
+        <p:spPr>
+          <a:xfrm>
+            <a:off x="3971498" y="1825625"/>
+            <a:ext cx="7955031" cy="4351338"/>
+          </a:xfrm>
+          <a:prstGeom prst="rect">
+            <a:avLst/>
+          </a:prstGeom>
+        </p:spPr>
+        <p:txBody>
+          <a:bodyPr vert="horz" lIns="91440" tIns="45720" rIns="91440" bIns="45720" rtlCol="0">
+            <a:normAutofit/>
+          </a:bodyPr>
+          <a:lstStyle>
+            <a:lvl1pPr marL="228600" indent="-228600" algn="l" defTabSz="914400" rtl="0" eaLnBrk="1" latinLnBrk="0" hangingPunct="1">
+              <a:lnSpc>
+                <a:spcPct val="90000"/>
+              </a:lnSpc>
+              <a:spcBef>
+                <a:spcPts val="1000"/>
+              </a:spcBef>
+              <a:buFont typeface="Arial" panose="020B0604020202020204" pitchFamily="34" charset="0"/>
+              <a:buChar char="•"/>
+              <a:defRPr sz="2800" kern="1200">
+                <a:solidFill>
+                  <a:schemeClr val="tx1"/>
+                </a:solidFill>
+                <a:latin typeface="+mn-lt"/>
+                <a:ea typeface="+mn-ea"/>
+                <a:cs typeface="+mn-cs"/>
+              </a:defRPr>
+            </a:lvl1pPr>
+            <a:lvl2pPr marL="685800" indent="-228600" algn="l" defTabSz="914400" rtl="0" eaLnBrk="1" latinLnBrk="0" hangingPunct="1">
+              <a:lnSpc>
+                <a:spcPct val="90000"/>
+              </a:lnSpc>
+              <a:spcBef>
+                <a:spcPts val="500"/>
+              </a:spcBef>
+              <a:buFont typeface="Arial" panose="020B0604020202020204" pitchFamily="34" charset="0"/>
+              <a:buChar char="•"/>
+              <a:defRPr sz="2400" kern="1200">
+                <a:solidFill>
+                  <a:schemeClr val="tx1"/>
+                </a:solidFill>
+                <a:latin typeface="+mn-lt"/>
+                <a:ea typeface="+mn-ea"/>
+                <a:cs typeface="+mn-cs"/>
+              </a:defRPr>
+            </a:lvl2pPr>
+            <a:lvl3pPr marL="1143000" indent="-228600" algn="l" defTabSz="914400" rtl="0" eaLnBrk="1" latinLnBrk="0" hangingPunct="1">
+              <a:lnSpc>
+                <a:spcPct val="90000"/>
+              </a:lnSpc>
+              <a:spcBef>
+                <a:spcPts val="500"/>
+              </a:spcBef>
+              <a:buFont typeface="Arial" panose="020B0604020202020204" pitchFamily="34" charset="0"/>
+              <a:buChar char="•"/>
+              <a:defRPr sz="2000" kern="1200">
+                <a:solidFill>
+                  <a:schemeClr val="tx1"/>
+                </a:solidFill>
+                <a:latin typeface="+mn-lt"/>
+                <a:ea typeface="+mn-ea"/>
+                <a:cs typeface="+mn-cs"/>
+              </a:defRPr>
+            </a:lvl3pPr>
+            <a:lvl4pPr marL="1600200" indent="-228600" algn="l" defTabSz="914400" rtl="0" eaLnBrk="1" latinLnBrk="0" hangingPunct="1">
+              <a:lnSpc>
+                <a:spcPct val="90000"/>
+              </a:lnSpc>
+              <a:spcBef>
+                <a:spcPts val="500"/>
+              </a:spcBef>
+              <a:buFont typeface="Arial" panose="020B0604020202020204" pitchFamily="34" charset="0"/>
+              <a:buChar char="•"/>
+              <a:defRPr sz="1800" kern="1200">
+                <a:solidFill>
+                  <a:schemeClr val="tx1"/>
+                </a:solidFill>
+                <a:latin typeface="+mn-lt"/>
+                <a:ea typeface="+mn-ea"/>
+                <a:cs typeface="+mn-cs"/>
+              </a:defRPr>
+            </a:lvl4pPr>
+            <a:lvl5pPr marL="2057400" indent="-228600" algn="l" defTabSz="914400" rtl="0" eaLnBrk="1" latinLnBrk="0" hangingPunct="1">
+              <a:lnSpc>
+                <a:spcPct val="90000"/>
+              </a:lnSpc>
+              <a:spcBef>
+                <a:spcPts val="500"/>
+              </a:spcBef>
+              <a:buFont typeface="Arial" panose="020B0604020202020204" pitchFamily="34" charset="0"/>
+              <a:buChar char="•"/>
+              <a:defRPr sz="1800" kern="1200">
+                <a:solidFill>
+                  <a:schemeClr val="tx1"/>
+                </a:solidFill>
+                <a:latin typeface="+mn-lt"/>
+                <a:ea typeface="+mn-ea"/>
+                <a:cs typeface="+mn-cs"/>
+              </a:defRPr>
+            </a:lvl5pPr>
+            <a:lvl6pPr marL="2514600" indent="-228600" algn="l" defTabSz="914400" rtl="0" eaLnBrk="1" latinLnBrk="0" hangingPunct="1">
+              <a:lnSpc>
+                <a:spcPct val="90000"/>
+              </a:lnSpc>
+              <a:spcBef>
+                <a:spcPts val="500"/>
+              </a:spcBef>
+              <a:buFont typeface="Arial" panose="020B0604020202020204" pitchFamily="34" charset="0"/>
+              <a:buChar char="•"/>
+              <a:defRPr sz="1800" kern="1200">
+                <a:solidFill>
+                  <a:schemeClr val="tx1"/>
+                </a:solidFill>
+                <a:latin typeface="+mn-lt"/>
+                <a:ea typeface="+mn-ea"/>
+                <a:cs typeface="+mn-cs"/>
+              </a:defRPr>
+            </a:lvl6pPr>
+            <a:lvl7pPr marL="2971800" indent="-228600" algn="l" defTabSz="914400" rtl="0" eaLnBrk="1" latinLnBrk="0" hangingPunct="1">
+              <a:lnSpc>
+                <a:spcPct val="90000"/>
+              </a:lnSpc>
+              <a:spcBef>
+                <a:spcPts val="500"/>
+              </a:spcBef>
+              <a:buFont typeface="Arial" panose="020B0604020202020204" pitchFamily="34" charset="0"/>
+              <a:buChar char="•"/>
+              <a:defRPr sz="1800" kern="1200">
+                <a:solidFill>
+                  <a:schemeClr val="tx1"/>
+                </a:solidFill>
+                <a:latin typeface="+mn-lt"/>
+                <a:ea typeface="+mn-ea"/>
+                <a:cs typeface="+mn-cs"/>
+              </a:defRPr>
+            </a:lvl7pPr>
+            <a:lvl8pPr marL="3429000" indent="-228600" algn="l" defTabSz="914400" rtl="0" eaLnBrk="1" latinLnBrk="0" hangingPunct="1">
+              <a:lnSpc>
+                <a:spcPct val="90000"/>
+              </a:lnSpc>
+              <a:spcBef>
+                <a:spcPts val="500"/>
+              </a:spcBef>
+              <a:buFont typeface="Arial" panose="020B0604020202020204" pitchFamily="34" charset="0"/>
+              <a:buChar char="•"/>
+              <a:defRPr sz="1800" kern="1200">
+                <a:solidFill>
+                  <a:schemeClr val="tx1"/>
+                </a:solidFill>
+                <a:latin typeface="+mn-lt"/>
+                <a:ea typeface="+mn-ea"/>
+                <a:cs typeface="+mn-cs"/>
+              </a:defRPr>
+            </a:lvl8pPr>
+            <a:lvl9pPr marL="3886200" indent="-228600" algn="l" defTabSz="914400" rtl="0" eaLnBrk="1" latinLnBrk="0" hangingPunct="1">
+              <a:lnSpc>
+                <a:spcPct val="90000"/>
+              </a:lnSpc>
+              <a:spcBef>
+                <a:spcPts val="500"/>
+              </a:spcBef>
+              <a:buFont typeface="Arial" panose="020B0604020202020204" pitchFamily="34" charset="0"/>
+              <a:buChar char="•"/>
+              <a:defRPr sz="1800" kern="1200">
+                <a:solidFill>
+                  <a:schemeClr val="tx1"/>
+                </a:solidFill>
+                <a:latin typeface="+mn-lt"/>
+                <a:ea typeface="+mn-ea"/>
+                <a:cs typeface="+mn-cs"/>
+              </a:defRPr>
+            </a:lvl9pPr>
+          </a:lstStyle>
+          <a:p>
+            <a:pPr marL="514350" indent="-514350">
+              <a:spcAft>
+                <a:spcPts val="600"/>
+              </a:spcAft>
+              <a:buFont typeface="Arial" panose="020B0604020202020204" pitchFamily="34" charset="0"/>
+              <a:buAutoNum type="arabicParenR"/>
+            </a:pPr>
+            <a:r>
+              <a:rPr lang="en-US" dirty="0">
+                <a:latin typeface="Book Antiqua" panose="02040602050305030304" pitchFamily="18" charset="0"/>
+              </a:rPr>
+              <a:t>download from </a:t>
+            </a:r>
+            <a:r>
+              <a:rPr lang="en-US" b="1" dirty="0">
+                <a:latin typeface="Book Antiqua" panose="02040602050305030304" pitchFamily="18" charset="0"/>
+              </a:rPr>
+              <a:t>pgadmin.org</a:t>
+            </a:r>
+          </a:p>
+          <a:p>
+            <a:pPr marL="514350" indent="-514350">
+              <a:spcAft>
+                <a:spcPts val="600"/>
+              </a:spcAft>
+              <a:buFont typeface="Arial" panose="020B0604020202020204" pitchFamily="34" charset="0"/>
+              <a:buAutoNum type="arabicParenR"/>
+            </a:pPr>
+            <a:r>
+              <a:rPr lang="en-US" dirty="0">
+                <a:latin typeface="Book Antiqua" panose="02040602050305030304" pitchFamily="18" charset="0"/>
+              </a:rPr>
+              <a:t>connect to server</a:t>
+            </a:r>
+          </a:p>
+          <a:p>
+            <a:pPr lvl="1">
+              <a:spcAft>
+                <a:spcPts val="600"/>
+              </a:spcAft>
+            </a:pPr>
+            <a:r>
+              <a:rPr lang="en-US" dirty="0">
+                <a:latin typeface="Book Antiqua" panose="02040602050305030304" pitchFamily="18" charset="0"/>
+              </a:rPr>
+              <a:t>port: 5432</a:t>
+            </a:r>
+          </a:p>
+          <a:p>
+            <a:pPr lvl="1">
+              <a:spcAft>
+                <a:spcPts val="600"/>
+              </a:spcAft>
+            </a:pPr>
+            <a:r>
+              <a:rPr lang="en-US" dirty="0">
+                <a:latin typeface="Book Antiqua" panose="02040602050305030304" pitchFamily="18" charset="0"/>
+              </a:rPr>
+              <a:t>username: </a:t>
+            </a:r>
+            <a:r>
+              <a:rPr lang="en-US" dirty="0" err="1">
+                <a:latin typeface="Book Antiqua" panose="02040602050305030304" pitchFamily="18" charset="0"/>
+              </a:rPr>
+              <a:t>postgres</a:t>
+            </a:r>
+            <a:endParaRPr lang="en-US" dirty="0">
+              <a:latin typeface="Book Antiqua" panose="02040602050305030304" pitchFamily="18" charset="0"/>
+            </a:endParaRPr>
+          </a:p>
+          <a:p>
+            <a:pPr lvl="1">
+              <a:spcAft>
+                <a:spcPts val="600"/>
+              </a:spcAft>
+            </a:pPr>
+            <a:r>
+              <a:rPr lang="en-US" dirty="0">
+                <a:latin typeface="Book Antiqua" panose="02040602050305030304" pitchFamily="18" charset="0"/>
+              </a:rPr>
+              <a:t>password: </a:t>
+            </a:r>
+            <a:r>
+              <a:rPr lang="en-US" dirty="0" err="1">
+                <a:latin typeface="Book Antiqua" panose="02040602050305030304" pitchFamily="18" charset="0"/>
+              </a:rPr>
+              <a:t>postgres</a:t>
+            </a:r>
+            <a:endParaRPr lang="en-US" dirty="0">
+              <a:latin typeface="Book Antiqua" panose="02040602050305030304" pitchFamily="18" charset="0"/>
+            </a:endParaRPr>
+          </a:p>
+          <a:p>
+            <a:pPr marL="514350" indent="-514350">
+              <a:spcAft>
+                <a:spcPts val="600"/>
+              </a:spcAft>
+              <a:buFont typeface="Arial" panose="020B0604020202020204" pitchFamily="34" charset="0"/>
+              <a:buAutoNum type="arabicParenR"/>
+            </a:pPr>
+            <a:r>
+              <a:rPr lang="en-US" dirty="0">
+                <a:latin typeface="Book Antiqua" panose="02040602050305030304" pitchFamily="18" charset="0"/>
+              </a:rPr>
+              <a:t>modify tables/columns</a:t>
+            </a:r>
+          </a:p>
+          <a:p>
+            <a:pPr marL="0" indent="0">
+              <a:buFont typeface="Arial" panose="020B0604020202020204" pitchFamily="34" charset="0"/>
+              <a:buNone/>
+            </a:pPr>
+            <a:endParaRPr lang="en-US" dirty="0">
+              <a:latin typeface="Book Antiqua" panose="02040602050305030304" pitchFamily="18" charset="0"/>
+            </a:endParaRPr>
+          </a:p>
+        </p:txBody>
+      </p:sp>
+    </p:spTree>
+    <p:extLst>
+      <p:ext uri="{BB962C8B-B14F-4D97-AF65-F5344CB8AC3E}">
+        <p14:creationId xmlns:p14="http://schemas.microsoft.com/office/powerpoint/2010/main" val="551575577"/>
+      </p:ext>
+    </p:extLst>
+  </p:cSld>
+  <p:clrMapOvr>
+    <a:masterClrMapping/>
+  </p:clrMapOvr>
+</p:sld>
+</file>
+
+<file path=ppt/slides/slide11.xml><?xml version="1.0" encoding="utf-8"?>
+<p:sld xmlns:a="http://schemas.openxmlformats.org/drawingml/2006/main" xmlns:r="http://schemas.openxmlformats.org/officeDocument/2006/relationships" xmlns:p="http://schemas.openxmlformats.org/presentationml/2006/main">
+  <p:cSld>
+    <p:spTree>
+      <p:nvGrpSpPr>
+        <p:cNvPr id="1" name=""/>
+        <p:cNvGrpSpPr/>
+        <p:nvPr/>
+      </p:nvGrpSpPr>
+      <p:grpSpPr>
+        <a:xfrm>
+          <a:off x="0" y="0"/>
+          <a:ext cx="0" cy="0"/>
+          <a:chOff x="0" y="0"/>
+          <a:chExt cx="0" cy="0"/>
+        </a:xfrm>
+      </p:grpSpPr>
+      <p:sp>
+        <p:nvSpPr>
+          <p:cNvPr id="2" name="Title 1">
+            <a:extLst>
+              <a:ext uri="{FF2B5EF4-FFF2-40B4-BE49-F238E27FC236}">
+                <a16:creationId xmlns:a16="http://schemas.microsoft.com/office/drawing/2014/main" id="{1903578F-60F4-4A7B-9DE7-BAC224182231}"/>
+              </a:ext>
+            </a:extLst>
+          </p:cNvPr>
+          <p:cNvSpPr>
+            <a:spLocks noGrp="1"/>
+          </p:cNvSpPr>
+          <p:nvPr>
+            <p:ph type="title"/>
+          </p:nvPr>
+        </p:nvSpPr>
+        <p:spPr/>
+        <p:txBody>
+          <a:bodyPr/>
+          <a:lstStyle/>
+          <a:p>
+            <a:r>
+              <a:rPr lang="en-US" dirty="0">
+                <a:latin typeface="Abadi Extra Light" panose="020B0204020104020204" pitchFamily="34" charset="0"/>
+              </a:rPr>
+              <a:t>Grafana</a:t>
+            </a:r>
+          </a:p>
+        </p:txBody>
+      </p:sp>
+      <p:cxnSp>
+        <p:nvCxnSpPr>
+          <p:cNvPr id="15" name="Straight Connector 14">
+            <a:extLst>
+              <a:ext uri="{FF2B5EF4-FFF2-40B4-BE49-F238E27FC236}">
+                <a16:creationId xmlns:a16="http://schemas.microsoft.com/office/drawing/2014/main" id="{17593F09-B2DB-4D0B-B67A-FDBBA69A0934}"/>
+              </a:ext>
+            </a:extLst>
+          </p:cNvPr>
+          <p:cNvCxnSpPr>
+            <a:cxnSpLocks/>
+          </p:cNvCxnSpPr>
+          <p:nvPr/>
+        </p:nvCxnSpPr>
+        <p:spPr>
+          <a:xfrm>
+            <a:off x="761837" y="1396181"/>
+            <a:ext cx="10668327" cy="0"/>
+          </a:xfrm>
+          <a:prstGeom prst="line">
+            <a:avLst/>
+          </a:prstGeom>
+          <a:ln>
+            <a:solidFill>
+              <a:schemeClr val="bg1">
+                <a:lumMod val="85000"/>
+              </a:schemeClr>
+            </a:solidFill>
+          </a:ln>
+        </p:spPr>
+        <p:style>
+          <a:lnRef idx="1">
+            <a:schemeClr val="accent1"/>
+          </a:lnRef>
+          <a:fillRef idx="0">
+            <a:schemeClr val="accent1"/>
+          </a:fillRef>
+          <a:effectRef idx="0">
+            <a:schemeClr val="accent1"/>
+          </a:effectRef>
+          <a:fontRef idx="minor">
+            <a:schemeClr val="tx1"/>
+          </a:fontRef>
+        </p:style>
+      </p:cxnSp>
+      <p:cxnSp>
+        <p:nvCxnSpPr>
+          <p:cNvPr id="10" name="Straight Connector 9">
+            <a:extLst>
+              <a:ext uri="{FF2B5EF4-FFF2-40B4-BE49-F238E27FC236}">
+                <a16:creationId xmlns:a16="http://schemas.microsoft.com/office/drawing/2014/main" id="{8830F824-E101-496B-B421-67A36E4D8518}"/>
+              </a:ext>
+            </a:extLst>
+          </p:cNvPr>
+          <p:cNvCxnSpPr>
+            <a:cxnSpLocks/>
+          </p:cNvCxnSpPr>
+          <p:nvPr/>
+        </p:nvCxnSpPr>
+        <p:spPr>
+          <a:xfrm>
+            <a:off x="3783106" y="1396181"/>
+            <a:ext cx="0" cy="3776454"/>
+          </a:xfrm>
+          <a:prstGeom prst="line">
+            <a:avLst/>
+          </a:prstGeom>
+          <a:ln>
+            <a:solidFill>
+              <a:schemeClr val="bg1">
+                <a:lumMod val="85000"/>
+              </a:schemeClr>
+            </a:solidFill>
+          </a:ln>
+        </p:spPr>
+        <p:style>
+          <a:lnRef idx="1">
+            <a:schemeClr val="accent1"/>
+          </a:lnRef>
+          <a:fillRef idx="0">
+            <a:schemeClr val="accent1"/>
+          </a:fillRef>
+          <a:effectRef idx="0">
+            <a:schemeClr val="accent1"/>
+          </a:effectRef>
+          <a:fontRef idx="minor">
+            <a:schemeClr val="tx1"/>
+          </a:fontRef>
+        </p:style>
+      </p:cxnSp>
+      <p:sp>
+        <p:nvSpPr>
+          <p:cNvPr id="14" name="Content Placeholder 2">
+            <a:extLst>
+              <a:ext uri="{FF2B5EF4-FFF2-40B4-BE49-F238E27FC236}">
+                <a16:creationId xmlns:a16="http://schemas.microsoft.com/office/drawing/2014/main" id="{A10533A2-523F-42F5-A4AF-3DA5416198F6}"/>
+              </a:ext>
+            </a:extLst>
+          </p:cNvPr>
+          <p:cNvSpPr txBox="1">
+            <a:spLocks/>
+          </p:cNvSpPr>
+          <p:nvPr/>
+        </p:nvSpPr>
+        <p:spPr>
+          <a:xfrm>
+            <a:off x="3971498" y="1825625"/>
+            <a:ext cx="7955031" cy="4351338"/>
+          </a:xfrm>
+          <a:prstGeom prst="rect">
+            <a:avLst/>
+          </a:prstGeom>
+        </p:spPr>
+        <p:txBody>
+          <a:bodyPr vert="horz" lIns="91440" tIns="45720" rIns="91440" bIns="45720" rtlCol="0">
+            <a:normAutofit/>
+          </a:bodyPr>
+          <a:lstStyle>
+            <a:lvl1pPr marL="228600" indent="-228600" algn="l" defTabSz="914400" rtl="0" eaLnBrk="1" latinLnBrk="0" hangingPunct="1">
+              <a:lnSpc>
+                <a:spcPct val="90000"/>
+              </a:lnSpc>
+              <a:spcBef>
+                <a:spcPts val="1000"/>
+              </a:spcBef>
+              <a:buFont typeface="Arial" panose="020B0604020202020204" pitchFamily="34" charset="0"/>
+              <a:buChar char="•"/>
+              <a:defRPr sz="2800" kern="1200">
+                <a:solidFill>
+                  <a:schemeClr val="tx1"/>
+                </a:solidFill>
+                <a:latin typeface="+mn-lt"/>
+                <a:ea typeface="+mn-ea"/>
+                <a:cs typeface="+mn-cs"/>
+              </a:defRPr>
+            </a:lvl1pPr>
+            <a:lvl2pPr marL="685800" indent="-228600" algn="l" defTabSz="914400" rtl="0" eaLnBrk="1" latinLnBrk="0" hangingPunct="1">
+              <a:lnSpc>
+                <a:spcPct val="90000"/>
+              </a:lnSpc>
+              <a:spcBef>
+                <a:spcPts val="500"/>
+              </a:spcBef>
+              <a:buFont typeface="Arial" panose="020B0604020202020204" pitchFamily="34" charset="0"/>
+              <a:buChar char="•"/>
+              <a:defRPr sz="2400" kern="1200">
+                <a:solidFill>
+                  <a:schemeClr val="tx1"/>
+                </a:solidFill>
+                <a:latin typeface="+mn-lt"/>
+                <a:ea typeface="+mn-ea"/>
+                <a:cs typeface="+mn-cs"/>
+              </a:defRPr>
+            </a:lvl2pPr>
+            <a:lvl3pPr marL="1143000" indent="-228600" algn="l" defTabSz="914400" rtl="0" eaLnBrk="1" latinLnBrk="0" hangingPunct="1">
+              <a:lnSpc>
+                <a:spcPct val="90000"/>
+              </a:lnSpc>
+              <a:spcBef>
+                <a:spcPts val="500"/>
+              </a:spcBef>
+              <a:buFont typeface="Arial" panose="020B0604020202020204" pitchFamily="34" charset="0"/>
+              <a:buChar char="•"/>
+              <a:defRPr sz="2000" kern="1200">
+                <a:solidFill>
+                  <a:schemeClr val="tx1"/>
+                </a:solidFill>
+                <a:latin typeface="+mn-lt"/>
+                <a:ea typeface="+mn-ea"/>
+                <a:cs typeface="+mn-cs"/>
+              </a:defRPr>
+            </a:lvl3pPr>
+            <a:lvl4pPr marL="1600200" indent="-228600" algn="l" defTabSz="914400" rtl="0" eaLnBrk="1" latinLnBrk="0" hangingPunct="1">
+              <a:lnSpc>
+                <a:spcPct val="90000"/>
+              </a:lnSpc>
+              <a:spcBef>
+                <a:spcPts val="500"/>
+              </a:spcBef>
+              <a:buFont typeface="Arial" panose="020B0604020202020204" pitchFamily="34" charset="0"/>
+              <a:buChar char="•"/>
+              <a:defRPr sz="1800" kern="1200">
+                <a:solidFill>
+                  <a:schemeClr val="tx1"/>
+                </a:solidFill>
+                <a:latin typeface="+mn-lt"/>
+                <a:ea typeface="+mn-ea"/>
+                <a:cs typeface="+mn-cs"/>
+              </a:defRPr>
+            </a:lvl4pPr>
+            <a:lvl5pPr marL="2057400" indent="-228600" algn="l" defTabSz="914400" rtl="0" eaLnBrk="1" latinLnBrk="0" hangingPunct="1">
+              <a:lnSpc>
+                <a:spcPct val="90000"/>
+              </a:lnSpc>
+              <a:spcBef>
+                <a:spcPts val="500"/>
+              </a:spcBef>
+              <a:buFont typeface="Arial" panose="020B0604020202020204" pitchFamily="34" charset="0"/>
+              <a:buChar char="•"/>
+              <a:defRPr sz="1800" kern="1200">
+                <a:solidFill>
+                  <a:schemeClr val="tx1"/>
+                </a:solidFill>
+                <a:latin typeface="+mn-lt"/>
+                <a:ea typeface="+mn-ea"/>
+                <a:cs typeface="+mn-cs"/>
+              </a:defRPr>
+            </a:lvl5pPr>
+            <a:lvl6pPr marL="2514600" indent="-228600" algn="l" defTabSz="914400" rtl="0" eaLnBrk="1" latinLnBrk="0" hangingPunct="1">
+              <a:lnSpc>
+                <a:spcPct val="90000"/>
+              </a:lnSpc>
+              <a:spcBef>
+                <a:spcPts val="500"/>
+              </a:spcBef>
+              <a:buFont typeface="Arial" panose="020B0604020202020204" pitchFamily="34" charset="0"/>
+              <a:buChar char="•"/>
+              <a:defRPr sz="1800" kern="1200">
+                <a:solidFill>
+                  <a:schemeClr val="tx1"/>
+                </a:solidFill>
+                <a:latin typeface="+mn-lt"/>
+                <a:ea typeface="+mn-ea"/>
+                <a:cs typeface="+mn-cs"/>
+              </a:defRPr>
+            </a:lvl6pPr>
+            <a:lvl7pPr marL="2971800" indent="-228600" algn="l" defTabSz="914400" rtl="0" eaLnBrk="1" latinLnBrk="0" hangingPunct="1">
+              <a:lnSpc>
+                <a:spcPct val="90000"/>
+              </a:lnSpc>
+              <a:spcBef>
+                <a:spcPts val="500"/>
+              </a:spcBef>
+              <a:buFont typeface="Arial" panose="020B0604020202020204" pitchFamily="34" charset="0"/>
+              <a:buChar char="•"/>
+              <a:defRPr sz="1800" kern="1200">
+                <a:solidFill>
+                  <a:schemeClr val="tx1"/>
+                </a:solidFill>
+                <a:latin typeface="+mn-lt"/>
+                <a:ea typeface="+mn-ea"/>
+                <a:cs typeface="+mn-cs"/>
+              </a:defRPr>
+            </a:lvl7pPr>
+            <a:lvl8pPr marL="3429000" indent="-228600" algn="l" defTabSz="914400" rtl="0" eaLnBrk="1" latinLnBrk="0" hangingPunct="1">
+              <a:lnSpc>
+                <a:spcPct val="90000"/>
+              </a:lnSpc>
+              <a:spcBef>
+                <a:spcPts val="500"/>
+              </a:spcBef>
+              <a:buFont typeface="Arial" panose="020B0604020202020204" pitchFamily="34" charset="0"/>
+              <a:buChar char="•"/>
+              <a:defRPr sz="1800" kern="1200">
+                <a:solidFill>
+                  <a:schemeClr val="tx1"/>
+                </a:solidFill>
+                <a:latin typeface="+mn-lt"/>
+                <a:ea typeface="+mn-ea"/>
+                <a:cs typeface="+mn-cs"/>
+              </a:defRPr>
+            </a:lvl8pPr>
+            <a:lvl9pPr marL="3886200" indent="-228600" algn="l" defTabSz="914400" rtl="0" eaLnBrk="1" latinLnBrk="0" hangingPunct="1">
+              <a:lnSpc>
+                <a:spcPct val="90000"/>
+              </a:lnSpc>
+              <a:spcBef>
+                <a:spcPts val="500"/>
+              </a:spcBef>
+              <a:buFont typeface="Arial" panose="020B0604020202020204" pitchFamily="34" charset="0"/>
+              <a:buChar char="•"/>
+              <a:defRPr sz="1800" kern="1200">
+                <a:solidFill>
+                  <a:schemeClr val="tx1"/>
+                </a:solidFill>
+                <a:latin typeface="+mn-lt"/>
+                <a:ea typeface="+mn-ea"/>
+                <a:cs typeface="+mn-cs"/>
+              </a:defRPr>
+            </a:lvl9pPr>
+          </a:lstStyle>
+          <a:p>
+            <a:pPr marL="514350" indent="-514350">
+              <a:spcAft>
+                <a:spcPts val="600"/>
+              </a:spcAft>
+              <a:buAutoNum type="arabicParenR"/>
+            </a:pPr>
+            <a:r>
+              <a:rPr lang="en-US" dirty="0">
+                <a:latin typeface="Book Antiqua" panose="02040602050305030304" pitchFamily="18" charset="0"/>
+              </a:rPr>
+              <a:t>go to 192.168.4.10:3000</a:t>
+            </a:r>
+          </a:p>
+          <a:p>
+            <a:pPr marL="0" indent="0">
+              <a:spcAft>
+                <a:spcPts val="600"/>
+              </a:spcAft>
+              <a:buNone/>
+            </a:pPr>
+            <a:endParaRPr lang="en-US" dirty="0">
+              <a:latin typeface="Book Antiqua" panose="02040602050305030304" pitchFamily="18" charset="0"/>
+            </a:endParaRPr>
+          </a:p>
+          <a:p>
+            <a:pPr lvl="1">
+              <a:spcAft>
+                <a:spcPts val="600"/>
+              </a:spcAft>
+            </a:pPr>
+            <a:r>
+              <a:rPr lang="en-US" dirty="0">
+                <a:latin typeface="Book Antiqua" panose="02040602050305030304" pitchFamily="18" charset="0"/>
+              </a:rPr>
+              <a:t>username: admin</a:t>
+            </a:r>
+          </a:p>
+          <a:p>
+            <a:pPr lvl="1">
+              <a:spcAft>
+                <a:spcPts val="600"/>
+              </a:spcAft>
+            </a:pPr>
+            <a:r>
+              <a:rPr lang="en-US" dirty="0">
+                <a:latin typeface="Book Antiqua" panose="02040602050305030304" pitchFamily="18" charset="0"/>
+              </a:rPr>
+              <a:t>password: admin</a:t>
+            </a:r>
+          </a:p>
+          <a:p>
+            <a:pPr marL="514350" indent="-514350">
+              <a:spcAft>
+                <a:spcPts val="600"/>
+              </a:spcAft>
+              <a:buAutoNum type="arabicParenR"/>
+            </a:pPr>
+            <a:r>
+              <a:rPr lang="en-US" dirty="0">
+                <a:latin typeface="Book Antiqua" panose="02040602050305030304" pitchFamily="18" charset="0"/>
+              </a:rPr>
+              <a:t>add </a:t>
+            </a:r>
+            <a:r>
+              <a:rPr lang="en-US" dirty="0" err="1">
+                <a:latin typeface="Book Antiqua" panose="02040602050305030304" pitchFamily="18" charset="0"/>
+              </a:rPr>
+              <a:t>postgresQL</a:t>
+            </a:r>
+            <a:r>
+              <a:rPr lang="en-US" dirty="0">
+                <a:latin typeface="Book Antiqua" panose="02040602050305030304" pitchFamily="18" charset="0"/>
+              </a:rPr>
+              <a:t> data source</a:t>
+            </a:r>
+          </a:p>
+          <a:p>
+            <a:pPr marL="514350" indent="-514350">
+              <a:spcAft>
+                <a:spcPts val="600"/>
+              </a:spcAft>
+              <a:buAutoNum type="arabicParenR"/>
+            </a:pPr>
+            <a:r>
+              <a:rPr lang="en-US" dirty="0">
+                <a:latin typeface="Book Antiqua" panose="02040602050305030304" pitchFamily="18" charset="0"/>
+              </a:rPr>
+              <a:t>create dashboard with views</a:t>
+            </a:r>
+          </a:p>
+          <a:p>
+            <a:pPr marL="514350" indent="-514350">
+              <a:spcAft>
+                <a:spcPts val="600"/>
+              </a:spcAft>
+              <a:buAutoNum type="arabicParenR"/>
+            </a:pPr>
+            <a:endParaRPr lang="en-US" dirty="0">
+              <a:latin typeface="Book Antiqua" panose="02040602050305030304" pitchFamily="18" charset="0"/>
+            </a:endParaRPr>
+          </a:p>
+          <a:p>
+            <a:pPr marL="0" indent="0">
+              <a:buFont typeface="Arial" panose="020B0604020202020204" pitchFamily="34" charset="0"/>
+              <a:buNone/>
+            </a:pPr>
+            <a:endParaRPr lang="en-US" dirty="0">
+              <a:latin typeface="Book Antiqua" panose="02040602050305030304" pitchFamily="18" charset="0"/>
+            </a:endParaRPr>
+          </a:p>
+          <a:p>
+            <a:pPr marL="0" indent="0">
+              <a:buFont typeface="Arial" panose="020B0604020202020204" pitchFamily="34" charset="0"/>
+              <a:buNone/>
+            </a:pPr>
+            <a:endParaRPr lang="en-US" dirty="0">
+              <a:latin typeface="Book Antiqua" panose="02040602050305030304" pitchFamily="18" charset="0"/>
+            </a:endParaRPr>
+          </a:p>
+        </p:txBody>
+      </p:sp>
+      <p:pic>
+        <p:nvPicPr>
+          <p:cNvPr id="3" name="Picture 2">
+            <a:extLst>
+              <a:ext uri="{FF2B5EF4-FFF2-40B4-BE49-F238E27FC236}">
+                <a16:creationId xmlns:a16="http://schemas.microsoft.com/office/drawing/2014/main" id="{BA4C8D56-3A81-4506-8310-C764141634DE}"/>
+              </a:ext>
+            </a:extLst>
+          </p:cNvPr>
+          <p:cNvPicPr>
+            <a:picLocks noChangeAspect="1"/>
+          </p:cNvPicPr>
+          <p:nvPr/>
+        </p:nvPicPr>
+        <p:blipFill>
+          <a:blip r:embed="rId2"/>
+          <a:stretch>
+            <a:fillRect/>
+          </a:stretch>
+        </p:blipFill>
+        <p:spPr>
+          <a:xfrm>
+            <a:off x="761836" y="1465506"/>
+            <a:ext cx="2946706" cy="3637804"/>
+          </a:xfrm>
+          <a:prstGeom prst="rect">
+            <a:avLst/>
+          </a:prstGeom>
+        </p:spPr>
+      </p:pic>
+      <p:sp>
+        <p:nvSpPr>
+          <p:cNvPr id="8" name="Left Brace 7">
+            <a:extLst>
+              <a:ext uri="{FF2B5EF4-FFF2-40B4-BE49-F238E27FC236}">
+                <a16:creationId xmlns:a16="http://schemas.microsoft.com/office/drawing/2014/main" id="{3A33B98C-3362-4916-88CD-E8BCF002A7D9}"/>
+              </a:ext>
+            </a:extLst>
+          </p:cNvPr>
+          <p:cNvSpPr/>
+          <p:nvPr/>
+        </p:nvSpPr>
+        <p:spPr>
+          <a:xfrm rot="16200000">
+            <a:off x="6240946" y="1430931"/>
+            <a:ext cx="277906" cy="1859684"/>
+          </a:xfrm>
+          <a:prstGeom prst="leftBrace">
+            <a:avLst/>
+          </a:prstGeom>
+          <a:ln>
+            <a:solidFill>
+              <a:schemeClr val="bg1">
+                <a:lumMod val="65000"/>
+              </a:schemeClr>
+            </a:solidFill>
+          </a:ln>
+        </p:spPr>
+        <p:style>
+          <a:lnRef idx="1">
+            <a:schemeClr val="accent1"/>
+          </a:lnRef>
+          <a:fillRef idx="0">
+            <a:schemeClr val="accent1"/>
+          </a:fillRef>
+          <a:effectRef idx="0">
+            <a:schemeClr val="accent1"/>
+          </a:effectRef>
+          <a:fontRef idx="minor">
+            <a:schemeClr val="tx1"/>
+          </a:fontRef>
+        </p:style>
+        <p:txBody>
+          <a:bodyPr rtlCol="0" anchor="ctr"/>
+          <a:lstStyle/>
+          <a:p>
+            <a:pPr algn="ctr"/>
+            <a:endParaRPr lang="en-US"/>
+          </a:p>
+        </p:txBody>
+      </p:sp>
+      <p:sp>
+        <p:nvSpPr>
+          <p:cNvPr id="9" name="TextBox 8">
+            <a:extLst>
+              <a:ext uri="{FF2B5EF4-FFF2-40B4-BE49-F238E27FC236}">
+                <a16:creationId xmlns:a16="http://schemas.microsoft.com/office/drawing/2014/main" id="{E611CF58-0F4D-4337-839A-894EE3DA75B9}"/>
+              </a:ext>
+            </a:extLst>
+          </p:cNvPr>
+          <p:cNvSpPr txBox="1"/>
+          <p:nvPr/>
+        </p:nvSpPr>
+        <p:spPr>
+          <a:xfrm>
+            <a:off x="5548381" y="2497921"/>
+            <a:ext cx="1663036" cy="307777"/>
+          </a:xfrm>
+          <a:prstGeom prst="rect">
+            <a:avLst/>
+          </a:prstGeom>
+          <a:noFill/>
+        </p:spPr>
+        <p:txBody>
+          <a:bodyPr wrap="square" rtlCol="0">
+            <a:spAutoFit/>
+          </a:bodyPr>
+          <a:lstStyle/>
+          <a:p>
+            <a:pPr algn="ctr"/>
+            <a:r>
+              <a:rPr lang="en-US" sz="1400" dirty="0">
+                <a:solidFill>
+                  <a:schemeClr val="bg1">
+                    <a:lumMod val="65000"/>
+                  </a:schemeClr>
+                </a:solidFill>
+                <a:latin typeface="Book Antiqua" panose="02040602050305030304" pitchFamily="18" charset="0"/>
+                <a:cs typeface="Aparajita" panose="02020603050405020304" pitchFamily="18" charset="0"/>
+              </a:rPr>
+              <a:t>server </a:t>
+            </a:r>
+            <a:r>
+              <a:rPr lang="en-US" sz="1400" dirty="0" err="1">
+                <a:solidFill>
+                  <a:schemeClr val="bg1">
+                    <a:lumMod val="65000"/>
+                  </a:schemeClr>
+                </a:solidFill>
+                <a:latin typeface="Book Antiqua" panose="02040602050305030304" pitchFamily="18" charset="0"/>
+                <a:cs typeface="Aparajita" panose="02020603050405020304" pitchFamily="18" charset="0"/>
+              </a:rPr>
+              <a:t>ip</a:t>
+            </a:r>
+            <a:r>
+              <a:rPr lang="en-US" sz="1400" dirty="0">
+                <a:solidFill>
+                  <a:schemeClr val="bg1">
+                    <a:lumMod val="65000"/>
+                  </a:schemeClr>
+                </a:solidFill>
+                <a:latin typeface="Book Antiqua" panose="02040602050305030304" pitchFamily="18" charset="0"/>
+                <a:cs typeface="Aparajita" panose="02020603050405020304" pitchFamily="18" charset="0"/>
+              </a:rPr>
+              <a:t> address</a:t>
+            </a:r>
+          </a:p>
+        </p:txBody>
+      </p:sp>
+    </p:spTree>
+    <p:extLst>
+      <p:ext uri="{BB962C8B-B14F-4D97-AF65-F5344CB8AC3E}">
+        <p14:creationId xmlns:p14="http://schemas.microsoft.com/office/powerpoint/2010/main" val="929509870"/>
+      </p:ext>
+    </p:extLst>
+  </p:cSld>
+  <p:clrMapOvr>
+    <a:masterClrMapping/>
+  </p:clrMapOvr>
+</p:sld>
+</file>
+
+<file path=ppt/slides/slide12.xml><?xml version="1.0" encoding="utf-8"?>
+<p:sld xmlns:a="http://schemas.openxmlformats.org/drawingml/2006/main" xmlns:r="http://schemas.openxmlformats.org/officeDocument/2006/relationships" xmlns:p="http://schemas.openxmlformats.org/presentationml/2006/main">
+  <p:cSld>
+    <p:spTree>
+      <p:nvGrpSpPr>
+        <p:cNvPr id="1" name=""/>
+        <p:cNvGrpSpPr/>
+        <p:nvPr/>
+      </p:nvGrpSpPr>
+      <p:grpSpPr>
+        <a:xfrm>
+          <a:off x="0" y="0"/>
+          <a:ext cx="0" cy="0"/>
+          <a:chOff x="0" y="0"/>
+          <a:chExt cx="0" cy="0"/>
+        </a:xfrm>
+      </p:grpSpPr>
+      <p:sp>
+        <p:nvSpPr>
           <p:cNvPr id="4" name="Title 3">
             <a:extLst>
               <a:ext uri="{FF2B5EF4-FFF2-40B4-BE49-F238E27FC236}">
@@ -3465,7 +4576,7 @@
 </p:sld>
 </file>
 
-<file path=ppt/slides/slide11.xml><?xml version="1.0" encoding="utf-8"?>
+<file path=ppt/slides/slide13.xml><?xml version="1.0" encoding="utf-8"?>
 <p:sld xmlns:a="http://schemas.openxmlformats.org/drawingml/2006/main" xmlns:r="http://schemas.openxmlformats.org/officeDocument/2006/relationships" xmlns:p="http://schemas.openxmlformats.org/presentationml/2006/main">
   <p:cSld>
     <p:spTree>
@@ -3828,9 +4939,8 @@
           </a:prstGeom>
           <a:ln w="76200">
             <a:solidFill>
-              <a:schemeClr val="accent5">
-                <a:lumMod val="60000"/>
-                <a:lumOff val="40000"/>
+              <a:schemeClr val="bg1">
+                <a:lumMod val="85000"/>
               </a:schemeClr>
             </a:solidFill>
             <a:tailEnd type="triangle"/>
@@ -3876,9 +4986,8 @@
           </a:prstGeom>
           <a:ln w="76200">
             <a:solidFill>
-              <a:schemeClr val="accent5">
-                <a:lumMod val="60000"/>
-                <a:lumOff val="40000"/>
+              <a:schemeClr val="bg1">
+                <a:lumMod val="85000"/>
               </a:schemeClr>
             </a:solidFill>
             <a:prstDash val="sysDash"/>
@@ -3971,9 +5080,8 @@
           </a:prstGeom>
           <a:ln w="76200">
             <a:solidFill>
-              <a:schemeClr val="accent5">
-                <a:lumMod val="60000"/>
-                <a:lumOff val="40000"/>
+              <a:schemeClr val="bg1">
+                <a:lumMod val="85000"/>
               </a:schemeClr>
             </a:solidFill>
             <a:prstDash val="sysDash"/>
@@ -4040,9 +5148,8 @@
             </a:prstGeom>
             <a:ln w="76200">
               <a:solidFill>
-                <a:schemeClr val="accent5">
-                  <a:lumMod val="60000"/>
-                  <a:lumOff val="40000"/>
+                <a:schemeClr val="bg1">
+                  <a:lumMod val="85000"/>
                 </a:schemeClr>
               </a:solidFill>
               <a:prstDash val="sysDash"/>
@@ -4087,9 +5194,8 @@
             </a:prstGeom>
             <a:ln w="76200">
               <a:solidFill>
-                <a:schemeClr val="accent5">
-                  <a:lumMod val="60000"/>
-                  <a:lumOff val="40000"/>
+                <a:schemeClr val="bg1">
+                  <a:lumMod val="85000"/>
                 </a:schemeClr>
               </a:solidFill>
               <a:prstDash val="solid"/>
@@ -4215,6 +5321,51 @@
           <a:chExt cx="0" cy="0"/>
         </a:xfrm>
       </p:grpSpPr>
+      <p:cxnSp>
+        <p:nvCxnSpPr>
+          <p:cNvPr id="9" name="Straight Connector 8">
+            <a:extLst>
+              <a:ext uri="{FF2B5EF4-FFF2-40B4-BE49-F238E27FC236}">
+                <a16:creationId xmlns:a16="http://schemas.microsoft.com/office/drawing/2014/main" id="{9E4C6C2A-EA81-417A-BEAC-1AC15AC33D4C}"/>
+              </a:ext>
+            </a:extLst>
+          </p:cNvPr>
+          <p:cNvCxnSpPr>
+            <a:cxnSpLocks/>
+          </p:cNvCxnSpPr>
+          <p:nvPr/>
+        </p:nvCxnSpPr>
+        <p:spPr>
+          <a:xfrm>
+            <a:off x="3783106" y="1396181"/>
+            <a:ext cx="0" cy="3776454"/>
+          </a:xfrm>
+          <a:prstGeom prst="line">
+            <a:avLst/>
+          </a:prstGeom>
+          <a:ln>
+            <a:solidFill>
+              <a:schemeClr val="bg1">
+                <a:lumMod val="85000"/>
+              </a:schemeClr>
+            </a:solidFill>
+          </a:ln>
+        </p:spPr>
+        <p:style>
+          <a:lnRef idx="1">
+            <a:schemeClr val="accent1"/>
+          </a:lnRef>
+          <a:fillRef idx="0">
+            <a:schemeClr val="accent1"/>
+          </a:fillRef>
+          <a:effectRef idx="0">
+            <a:schemeClr val="accent1"/>
+          </a:effectRef>
+          <a:fontRef idx="minor">
+            <a:schemeClr val="tx1"/>
+          </a:fontRef>
+        </p:style>
+      </p:cxnSp>
       <p:sp>
         <p:nvSpPr>
           <p:cNvPr id="2" name="Title 1">
@@ -4486,9 +5637,8 @@
             </a:prstGeom>
             <a:ln w="57150">
               <a:solidFill>
-                <a:schemeClr val="accent5">
-                  <a:lumMod val="60000"/>
-                  <a:lumOff val="40000"/>
+                <a:schemeClr val="bg1">
+                  <a:lumMod val="85000"/>
                 </a:schemeClr>
               </a:solidFill>
               <a:tailEnd type="triangle"/>
@@ -4831,6 +5981,51 @@
           </a:fontRef>
         </p:style>
       </p:cxnSp>
+      <p:cxnSp>
+        <p:nvCxnSpPr>
+          <p:cNvPr id="6" name="Straight Connector 5">
+            <a:extLst>
+              <a:ext uri="{FF2B5EF4-FFF2-40B4-BE49-F238E27FC236}">
+                <a16:creationId xmlns:a16="http://schemas.microsoft.com/office/drawing/2014/main" id="{3AC32BFE-DEBE-484D-95EC-762004D01AB1}"/>
+              </a:ext>
+            </a:extLst>
+          </p:cNvPr>
+          <p:cNvCxnSpPr>
+            <a:cxnSpLocks/>
+          </p:cNvCxnSpPr>
+          <p:nvPr/>
+        </p:nvCxnSpPr>
+        <p:spPr>
+          <a:xfrm>
+            <a:off x="3783106" y="1396181"/>
+            <a:ext cx="0" cy="3776454"/>
+          </a:xfrm>
+          <a:prstGeom prst="line">
+            <a:avLst/>
+          </a:prstGeom>
+          <a:ln>
+            <a:solidFill>
+              <a:schemeClr val="bg1">
+                <a:lumMod val="85000"/>
+              </a:schemeClr>
+            </a:solidFill>
+          </a:ln>
+        </p:spPr>
+        <p:style>
+          <a:lnRef idx="1">
+            <a:schemeClr val="accent1"/>
+          </a:lnRef>
+          <a:fillRef idx="0">
+            <a:schemeClr val="accent1"/>
+          </a:fillRef>
+          <a:effectRef idx="0">
+            <a:schemeClr val="accent1"/>
+          </a:effectRef>
+          <a:fontRef idx="minor">
+            <a:schemeClr val="tx1"/>
+          </a:fontRef>
+        </p:style>
+      </p:cxnSp>
     </p:spTree>
     <p:extLst>
       <p:ext uri="{BB962C8B-B14F-4D97-AF65-F5344CB8AC3E}">
@@ -5188,11 +6383,10 @@
           <a:prstGeom prst="straightConnector1">
             <a:avLst/>
           </a:prstGeom>
-          <a:ln w="76200">
+          <a:ln w="57150">
             <a:solidFill>
-              <a:schemeClr val="accent5">
-                <a:lumMod val="60000"/>
-                <a:lumOff val="40000"/>
+              <a:schemeClr val="bg1">
+                <a:lumMod val="85000"/>
               </a:schemeClr>
             </a:solidFill>
             <a:prstDash val="sysDash"/>
@@ -5594,8 +6788,8 @@
         </p:blipFill>
         <p:spPr bwMode="auto">
           <a:xfrm>
-            <a:off x="588490" y="1396181"/>
-            <a:ext cx="3209661" cy="3209661"/>
+            <a:off x="588491" y="1396182"/>
+            <a:ext cx="3050312" cy="3050312"/>
           </a:xfrm>
           <a:prstGeom prst="rect">
             <a:avLst/>
@@ -5797,6 +6991,51 @@
           <a:xfrm>
             <a:off x="761837" y="1396181"/>
             <a:ext cx="10668327" cy="0"/>
+          </a:xfrm>
+          <a:prstGeom prst="line">
+            <a:avLst/>
+          </a:prstGeom>
+          <a:ln>
+            <a:solidFill>
+              <a:schemeClr val="bg1">
+                <a:lumMod val="85000"/>
+              </a:schemeClr>
+            </a:solidFill>
+          </a:ln>
+        </p:spPr>
+        <p:style>
+          <a:lnRef idx="1">
+            <a:schemeClr val="accent1"/>
+          </a:lnRef>
+          <a:fillRef idx="0">
+            <a:schemeClr val="accent1"/>
+          </a:fillRef>
+          <a:effectRef idx="0">
+            <a:schemeClr val="accent1"/>
+          </a:effectRef>
+          <a:fontRef idx="minor">
+            <a:schemeClr val="tx1"/>
+          </a:fontRef>
+        </p:style>
+      </p:cxnSp>
+      <p:cxnSp>
+        <p:nvCxnSpPr>
+          <p:cNvPr id="7" name="Straight Connector 6">
+            <a:extLst>
+              <a:ext uri="{FF2B5EF4-FFF2-40B4-BE49-F238E27FC236}">
+                <a16:creationId xmlns:a16="http://schemas.microsoft.com/office/drawing/2014/main" id="{BFB8E1AD-C537-4D68-A64E-A2D523E8315F}"/>
+              </a:ext>
+            </a:extLst>
+          </p:cNvPr>
+          <p:cNvCxnSpPr>
+            <a:cxnSpLocks/>
+          </p:cNvCxnSpPr>
+          <p:nvPr/>
+        </p:nvCxnSpPr>
+        <p:spPr>
+          <a:xfrm>
+            <a:off x="3783106" y="1396181"/>
+            <a:ext cx="0" cy="3776454"/>
           </a:xfrm>
           <a:prstGeom prst="line">
             <a:avLst/>
@@ -5916,7 +7155,7 @@
               <a:buNone/>
             </a:pPr>
             <a:r>
-              <a:rPr lang="en-US" b="1" dirty="0">
+              <a:rPr lang="en-US" dirty="0">
                 <a:latin typeface="Book Antiqua" panose="02040602050305030304" pitchFamily="18" charset="0"/>
               </a:rPr>
               <a:t>visualize data through </a:t>
@@ -5927,69 +7166,16 @@
               </a:rPr>
               <a:t>grafana</a:t>
             </a:r>
-            <a:endParaRPr lang="en-US" dirty="0">
-              <a:latin typeface="Book Antiqua" panose="02040602050305030304" pitchFamily="18" charset="0"/>
-            </a:endParaRPr>
-          </a:p>
-          <a:p>
-            <a:pPr marL="457200" lvl="1" indent="0">
-              <a:buNone/>
-            </a:pPr>
-            <a:r>
-              <a:rPr lang="en-US" dirty="0">
-                <a:latin typeface="Book Antiqua" panose="02040602050305030304" pitchFamily="18" charset="0"/>
-              </a:rPr>
-              <a:t>port: 3000</a:t>
-            </a:r>
             <a:endParaRPr lang="en-US" b="1" dirty="0">
               <a:latin typeface="Book Antiqua" panose="02040602050305030304" pitchFamily="18" charset="0"/>
             </a:endParaRPr>
           </a:p>
           <a:p>
-            <a:pPr marL="457200" lvl="1" indent="0">
+            <a:pPr marL="0" indent="0">
               <a:buNone/>
             </a:pPr>
             <a:r>
               <a:rPr lang="en-US" dirty="0">
-                <a:latin typeface="Book Antiqua" panose="02040602050305030304" pitchFamily="18" charset="0"/>
-              </a:rPr>
-              <a:t>username: admin</a:t>
-            </a:r>
-          </a:p>
-          <a:p>
-            <a:pPr marL="457200" lvl="1" indent="0">
-              <a:buNone/>
-            </a:pPr>
-            <a:r>
-              <a:rPr lang="en-US" dirty="0">
-                <a:latin typeface="Book Antiqua" panose="02040602050305030304" pitchFamily="18" charset="0"/>
-              </a:rPr>
-              <a:t>password: </a:t>
-            </a:r>
-            <a:r>
-              <a:rPr lang="en-US" dirty="0" err="1">
-                <a:latin typeface="Book Antiqua" panose="02040602050305030304" pitchFamily="18" charset="0"/>
-              </a:rPr>
-              <a:t>grafana</a:t>
-            </a:r>
-            <a:endParaRPr lang="en-US" dirty="0">
-              <a:latin typeface="Book Antiqua" panose="02040602050305030304" pitchFamily="18" charset="0"/>
-            </a:endParaRPr>
-          </a:p>
-          <a:p>
-            <a:pPr marL="0" indent="0">
-              <a:buNone/>
-            </a:pPr>
-            <a:endParaRPr lang="en-US" b="1" dirty="0">
-              <a:latin typeface="Book Antiqua" panose="02040602050305030304" pitchFamily="18" charset="0"/>
-            </a:endParaRPr>
-          </a:p>
-          <a:p>
-            <a:pPr marL="0" indent="0">
-              <a:buNone/>
-            </a:pPr>
-            <a:r>
-              <a:rPr lang="en-US" b="1" dirty="0">
                 <a:latin typeface="Book Antiqua" panose="02040602050305030304" pitchFamily="18" charset="0"/>
               </a:rPr>
               <a:t>configure database through </a:t>
@@ -6000,65 +7186,6 @@
               </a:rPr>
               <a:t>pgAdmin</a:t>
             </a:r>
-            <a:endParaRPr lang="en-US" b="1" dirty="0">
-              <a:latin typeface="Book Antiqua" panose="02040602050305030304" pitchFamily="18" charset="0"/>
-            </a:endParaRPr>
-          </a:p>
-          <a:p>
-            <a:pPr marL="457200" lvl="1" indent="0">
-              <a:buNone/>
-            </a:pPr>
-            <a:r>
-              <a:rPr lang="en-US" dirty="0">
-                <a:latin typeface="Book Antiqua" panose="02040602050305030304" pitchFamily="18" charset="0"/>
-              </a:rPr>
-              <a:t>port: 5432</a:t>
-            </a:r>
-          </a:p>
-          <a:p>
-            <a:pPr marL="457200" lvl="1" indent="0">
-              <a:buNone/>
-            </a:pPr>
-            <a:r>
-              <a:rPr lang="en-US" dirty="0">
-                <a:latin typeface="Book Antiqua" panose="02040602050305030304" pitchFamily="18" charset="0"/>
-              </a:rPr>
-              <a:t>username: </a:t>
-            </a:r>
-            <a:r>
-              <a:rPr lang="en-US" dirty="0" err="1">
-                <a:latin typeface="Book Antiqua" panose="02040602050305030304" pitchFamily="18" charset="0"/>
-              </a:rPr>
-              <a:t>postgres</a:t>
-            </a:r>
-            <a:endParaRPr lang="en-US" dirty="0">
-              <a:latin typeface="Book Antiqua" panose="02040602050305030304" pitchFamily="18" charset="0"/>
-            </a:endParaRPr>
-          </a:p>
-          <a:p>
-            <a:pPr marL="457200" lvl="1" indent="0">
-              <a:buNone/>
-            </a:pPr>
-            <a:r>
-              <a:rPr lang="en-US" dirty="0">
-                <a:latin typeface="Book Antiqua" panose="02040602050305030304" pitchFamily="18" charset="0"/>
-              </a:rPr>
-              <a:t>password: </a:t>
-            </a:r>
-            <a:r>
-              <a:rPr lang="en-US" dirty="0" err="1">
-                <a:latin typeface="Book Antiqua" panose="02040602050305030304" pitchFamily="18" charset="0"/>
-              </a:rPr>
-              <a:t>postgres</a:t>
-            </a:r>
-            <a:endParaRPr lang="en-US" dirty="0">
-              <a:latin typeface="Book Antiqua" panose="02040602050305030304" pitchFamily="18" charset="0"/>
-            </a:endParaRPr>
-          </a:p>
-          <a:p>
-            <a:pPr marL="0" indent="0">
-              <a:buNone/>
-            </a:pPr>
             <a:endParaRPr lang="en-US" b="1" dirty="0">
               <a:latin typeface="Book Antiqua" panose="02040602050305030304" pitchFamily="18" charset="0"/>
             </a:endParaRPr>
@@ -6125,9 +7252,9 @@
         <p:grpSpPr>
           <a:xfrm>
             <a:off x="692561" y="1594381"/>
-            <a:ext cx="2857356" cy="5346749"/>
+            <a:ext cx="2857356" cy="4898470"/>
             <a:chOff x="761836" y="1511251"/>
-            <a:chExt cx="2857356" cy="5346749"/>
+            <a:chExt cx="2857356" cy="4898470"/>
           </a:xfrm>
         </p:grpSpPr>
         <p:pic>
@@ -6144,7 +7271,7 @@
             </p:cNvPicPr>
             <p:nvPr/>
           </p:nvPicPr>
-          <p:blipFill>
+          <p:blipFill rotWithShape="1">
             <a:blip r:embed="rId2">
               <a:extLst>
                 <a:ext uri="{28A0092B-C50C-407E-A947-70E740481C1C}">
@@ -6152,15 +7279,13 @@
                 </a:ext>
               </a:extLst>
             </a:blip>
-            <a:srcRect/>
-            <a:stretch>
-              <a:fillRect/>
-            </a:stretch>
+            <a:srcRect b="16017"/>
+            <a:stretch/>
           </p:blipFill>
           <p:spPr bwMode="auto">
             <a:xfrm>
               <a:off x="761836" y="4059324"/>
-              <a:ext cx="2798676" cy="2798676"/>
+              <a:ext cx="2798676" cy="2350397"/>
             </a:xfrm>
             <a:prstGeom prst="rect">
               <a:avLst/>
@@ -6246,11 +7371,10 @@
             <a:prstGeom prst="straightConnector1">
               <a:avLst/>
             </a:prstGeom>
-            <a:ln w="76200">
+            <a:ln w="57150">
               <a:solidFill>
-                <a:schemeClr val="accent5">
-                  <a:lumMod val="60000"/>
-                  <a:lumOff val="40000"/>
+                <a:schemeClr val="bg1">
+                  <a:lumMod val="85000"/>
                 </a:schemeClr>
               </a:solidFill>
               <a:prstDash val="sysDash"/>
@@ -6321,6 +7445,51 @@
           </a:extLst>
         </p:spPr>
       </p:pic>
+      <p:cxnSp>
+        <p:nvCxnSpPr>
+          <p:cNvPr id="10" name="Straight Connector 9">
+            <a:extLst>
+              <a:ext uri="{FF2B5EF4-FFF2-40B4-BE49-F238E27FC236}">
+                <a16:creationId xmlns:a16="http://schemas.microsoft.com/office/drawing/2014/main" id="{8830F824-E101-496B-B421-67A36E4D8518}"/>
+              </a:ext>
+            </a:extLst>
+          </p:cNvPr>
+          <p:cNvCxnSpPr>
+            <a:cxnSpLocks/>
+          </p:cNvCxnSpPr>
+          <p:nvPr/>
+        </p:nvCxnSpPr>
+        <p:spPr>
+          <a:xfrm>
+            <a:off x="3783106" y="1396181"/>
+            <a:ext cx="0" cy="3776454"/>
+          </a:xfrm>
+          <a:prstGeom prst="line">
+            <a:avLst/>
+          </a:prstGeom>
+          <a:ln>
+            <a:solidFill>
+              <a:schemeClr val="bg1">
+                <a:lumMod val="85000"/>
+              </a:schemeClr>
+            </a:solidFill>
+          </a:ln>
+        </p:spPr>
+        <p:style>
+          <a:lnRef idx="1">
+            <a:schemeClr val="accent1"/>
+          </a:lnRef>
+          <a:fillRef idx="0">
+            <a:schemeClr val="accent1"/>
+          </a:fillRef>
+          <a:effectRef idx="0">
+            <a:schemeClr val="accent1"/>
+          </a:effectRef>
+          <a:fontRef idx="minor">
+            <a:schemeClr val="tx1"/>
+          </a:fontRef>
+        </p:style>
+      </p:cxnSp>
     </p:spTree>
     <p:extLst>
       <p:ext uri="{BB962C8B-B14F-4D97-AF65-F5344CB8AC3E}">

</xml_diff>